<commit_message>
updated paper and slides
</commit_message>
<xml_diff>
--- a/slides/encoding apocalypse and empire ppt.pptx
+++ b/slides/encoding apocalypse and empire ppt.pptx
@@ -5,7 +5,7 @@
     <p:sldMasterId id="2147483660" r:id="rId1"/>
   </p:sldMasterIdLst>
   <p:notesMasterIdLst>
-    <p:notesMasterId r:id="rId17"/>
+    <p:notesMasterId r:id="rId18"/>
   </p:notesMasterIdLst>
   <p:sldIdLst>
     <p:sldId id="256" r:id="rId2"/>
@@ -17,12 +17,13 @@
     <p:sldId id="258" r:id="rId8"/>
     <p:sldId id="267" r:id="rId9"/>
     <p:sldId id="272" r:id="rId10"/>
-    <p:sldId id="261" r:id="rId11"/>
-    <p:sldId id="265" r:id="rId12"/>
-    <p:sldId id="263" r:id="rId13"/>
-    <p:sldId id="266" r:id="rId14"/>
-    <p:sldId id="268" r:id="rId15"/>
-    <p:sldId id="264" r:id="rId16"/>
+    <p:sldId id="276" r:id="rId11"/>
+    <p:sldId id="261" r:id="rId12"/>
+    <p:sldId id="265" r:id="rId13"/>
+    <p:sldId id="263" r:id="rId14"/>
+    <p:sldId id="266" r:id="rId15"/>
+    <p:sldId id="268" r:id="rId16"/>
+    <p:sldId id="275" r:id="rId17"/>
   </p:sldIdLst>
   <p:sldSz cx="9144000" cy="6858000" type="screen4x3"/>
   <p:notesSz cx="6858000" cy="9144000"/>
@@ -489,11 +490,11 @@
           <c:showBubbleSize val="0"/>
         </c:dLbls>
         <c:gapWidth val="150"/>
-        <c:axId val="33247232"/>
-        <c:axId val="33249152"/>
+        <c:axId val="35084544"/>
+        <c:axId val="35099008"/>
       </c:barChart>
       <c:catAx>
-        <c:axId val="33247232"/>
+        <c:axId val="35084544"/>
         <c:scaling>
           <c:orientation val="minMax"/>
         </c:scaling>
@@ -521,7 +522,7 @@
         <c:majorTickMark val="none"/>
         <c:minorTickMark val="none"/>
         <c:tickLblPos val="nextTo"/>
-        <c:crossAx val="33249152"/>
+        <c:crossAx val="35099008"/>
         <c:crosses val="autoZero"/>
         <c:auto val="1"/>
         <c:lblAlgn val="ctr"/>
@@ -529,7 +530,7 @@
         <c:noMultiLvlLbl val="0"/>
       </c:catAx>
       <c:valAx>
-        <c:axId val="33249152"/>
+        <c:axId val="35099008"/>
         <c:scaling>
           <c:orientation val="minMax"/>
         </c:scaling>
@@ -559,7 +560,7 @@
         <c:majorTickMark val="out"/>
         <c:minorTickMark val="none"/>
         <c:tickLblPos val="nextTo"/>
-        <c:crossAx val="33247232"/>
+        <c:crossAx val="35084544"/>
         <c:crosses val="autoZero"/>
         <c:crossBetween val="between"/>
       </c:valAx>
@@ -700,11 +701,11 @@
           <c:showBubbleSize val="0"/>
         </c:dLbls>
         <c:gapWidth val="150"/>
-        <c:axId val="33283072"/>
-        <c:axId val="31564544"/>
+        <c:axId val="35125504"/>
+        <c:axId val="35139584"/>
       </c:barChart>
       <c:catAx>
-        <c:axId val="33283072"/>
+        <c:axId val="35125504"/>
         <c:scaling>
           <c:orientation val="minMax"/>
         </c:scaling>
@@ -713,7 +714,7 @@
         <c:majorTickMark val="none"/>
         <c:minorTickMark val="none"/>
         <c:tickLblPos val="nextTo"/>
-        <c:crossAx val="31564544"/>
+        <c:crossAx val="35139584"/>
         <c:crosses val="autoZero"/>
         <c:auto val="1"/>
         <c:lblAlgn val="ctr"/>
@@ -721,7 +722,7 @@
         <c:noMultiLvlLbl val="0"/>
       </c:catAx>
       <c:valAx>
-        <c:axId val="31564544"/>
+        <c:axId val="35139584"/>
         <c:scaling>
           <c:orientation val="minMax"/>
         </c:scaling>
@@ -732,7 +733,7 @@
         <c:majorTickMark val="none"/>
         <c:minorTickMark val="none"/>
         <c:tickLblPos val="nextTo"/>
-        <c:crossAx val="33283072"/>
+        <c:crossAx val="35125504"/>
         <c:crosses val="autoZero"/>
         <c:crossBetween val="between"/>
       </c:valAx>
@@ -844,7 +845,7 @@
           <a:p>
             <a:fld id="{B12C6722-22E0-4C51-8CE3-000AC6AADAFF}" type="datetimeFigureOut">
               <a:rPr lang="en-US" smtClean="0"/>
-              <a:t>11/22/2014</a:t>
+              <a:t>11/23/2014</a:t>
             </a:fld>
             <a:endParaRPr lang="en-US"/>
           </a:p>
@@ -1390,7 +1391,7 @@
           <a:p>
             <a:fld id="{059FCABF-21F5-4E39-BF56-BB94D9DD679E}" type="datetime1">
               <a:rPr lang="en-US" smtClean="0"/>
-              <a:t>11/22/2014</a:t>
+              <a:t>11/23/2014</a:t>
             </a:fld>
             <a:endParaRPr lang="en-US"/>
           </a:p>
@@ -1559,7 +1560,7 @@
           <a:p>
             <a:fld id="{D3984F5E-5E0B-4507-AE19-5E4070C29756}" type="datetime1">
               <a:rPr lang="en-US" smtClean="0"/>
-              <a:t>11/22/2014</a:t>
+              <a:t>11/23/2014</a:t>
             </a:fld>
             <a:endParaRPr lang="en-US"/>
           </a:p>
@@ -1738,7 +1739,7 @@
           <a:p>
             <a:fld id="{DFA7CE81-649A-45AB-A058-B40F5B535F2D}" type="datetime1">
               <a:rPr lang="en-US" smtClean="0"/>
-              <a:t>11/22/2014</a:t>
+              <a:t>11/23/2014</a:t>
             </a:fld>
             <a:endParaRPr lang="en-US"/>
           </a:p>
@@ -1907,7 +1908,7 @@
           <a:p>
             <a:fld id="{6B79649A-1E94-43B3-8541-0B544EA11591}" type="datetime1">
               <a:rPr lang="en-US" smtClean="0"/>
-              <a:t>11/22/2014</a:t>
+              <a:t>11/23/2014</a:t>
             </a:fld>
             <a:endParaRPr lang="en-US"/>
           </a:p>
@@ -2152,7 +2153,7 @@
           <a:p>
             <a:fld id="{CB0BFD50-8C93-4C0B-B9AF-86A763484240}" type="datetime1">
               <a:rPr lang="en-US" smtClean="0"/>
-              <a:t>11/22/2014</a:t>
+              <a:t>11/23/2014</a:t>
             </a:fld>
             <a:endParaRPr lang="en-US"/>
           </a:p>
@@ -2439,7 +2440,7 @@
           <a:p>
             <a:fld id="{C49A492A-0792-4324-A0AA-1BAE9261C71E}" type="datetime1">
               <a:rPr lang="en-US" smtClean="0"/>
-              <a:t>11/22/2014</a:t>
+              <a:t>11/23/2014</a:t>
             </a:fld>
             <a:endParaRPr lang="en-US"/>
           </a:p>
@@ -2872,7 +2873,7 @@
           <a:p>
             <a:fld id="{03780378-BA13-43F3-9515-DE76FA2578F4}" type="datetime1">
               <a:rPr lang="en-US" smtClean="0"/>
-              <a:t>11/22/2014</a:t>
+              <a:t>11/23/2014</a:t>
             </a:fld>
             <a:endParaRPr lang="en-US"/>
           </a:p>
@@ -2989,7 +2990,7 @@
           <a:p>
             <a:fld id="{A36BB5F9-885D-4990-8B7F-E6FE148BE5BD}" type="datetime1">
               <a:rPr lang="en-US" smtClean="0"/>
-              <a:t>11/22/2014</a:t>
+              <a:t>11/23/2014</a:t>
             </a:fld>
             <a:endParaRPr lang="en-US"/>
           </a:p>
@@ -3083,7 +3084,7 @@
           <a:p>
             <a:fld id="{D9BD8DC8-C1D9-4C68-90EC-65B319CCB882}" type="datetime1">
               <a:rPr lang="en-US" smtClean="0"/>
-              <a:t>11/22/2014</a:t>
+              <a:t>11/23/2014</a:t>
             </a:fld>
             <a:endParaRPr lang="en-US"/>
           </a:p>
@@ -3276,7 +3277,7 @@
           <a:p>
             <a:fld id="{D3B4040F-8F31-4A1B-A763-B0CE05A31B5F}" type="datetime1">
               <a:rPr lang="en-US" smtClean="0"/>
-              <a:t>11/22/2014</a:t>
+              <a:t>11/23/2014</a:t>
             </a:fld>
             <a:endParaRPr lang="en-US"/>
           </a:p>
@@ -3598,7 +3599,7 @@
           <a:p>
             <a:fld id="{013EBA1C-3767-4E29-B320-28DE4C6BA9FD}" type="datetime1">
               <a:rPr lang="en-US" smtClean="0"/>
-              <a:t>11/22/2014</a:t>
+              <a:t>11/23/2014</a:t>
             </a:fld>
             <a:endParaRPr lang="en-US"/>
           </a:p>
@@ -3985,7 +3986,7 @@
           <a:p>
             <a:fld id="{66481E23-8D0A-41E5-B41D-A0E08FFE4BC9}" type="datetime1">
               <a:rPr lang="en-US" smtClean="0"/>
-              <a:t>11/22/2014</a:t>
+              <a:t>11/23/2014</a:t>
             </a:fld>
             <a:endParaRPr lang="en-US"/>
           </a:p>
@@ -4333,11 +4334,7 @@
           <a:p>
             <a:r>
               <a:rPr lang="en-US" sz="4000" dirty="0" smtClean="0"/>
-              <a:t>Encoding Apocalypse and Empire: Online Editions of Rev 17:1–18:24 and 21:1–22:7 and the Display of Intertextual </a:t>
-            </a:r>
-            <a:r>
-              <a:rPr lang="en-US" sz="4000" dirty="0" smtClean="0"/>
-              <a:t>Allusions</a:t>
+              <a:t>Encoding Apocalypse and Empire: Online Editions of Rev 17:1–18:24 and 21:1–22:7 and the Display of Intertextual Allusions</a:t>
             </a:r>
             <a:endParaRPr lang="en-US" sz="4000" dirty="0"/>
           </a:p>
@@ -4373,11 +4370,7 @@
           <a:p>
             <a:r>
               <a:rPr lang="en-US" i="1" dirty="0" smtClean="0"/>
-              <a:t>Boston </a:t>
-            </a:r>
-            <a:r>
-              <a:rPr lang="en-US" i="1" dirty="0" smtClean="0"/>
-              <a:t>College</a:t>
+              <a:t>Boston College</a:t>
             </a:r>
           </a:p>
           <a:p>
@@ -4488,6 +4481,626 @@
         </p:nvSpPr>
         <p:spPr/>
         <p:txBody>
+          <a:bodyPr>
+            <a:noAutofit/>
+          </a:bodyPr>
+          <a:lstStyle/>
+          <a:p>
+            <a:r>
+              <a:rPr lang="en-US" sz="3600" dirty="0" smtClean="0"/>
+              <a:t>Density and Brevity</a:t>
+            </a:r>
+            <a:endParaRPr lang="en-US" sz="3600" dirty="0"/>
+          </a:p>
+        </p:txBody>
+      </p:sp>
+      <p:graphicFrame>
+        <p:nvGraphicFramePr>
+          <p:cNvPr id="6" name="Content Placeholder 5"/>
+          <p:cNvGraphicFramePr>
+            <a:graphicFrameLocks noGrp="1"/>
+          </p:cNvGraphicFramePr>
+          <p:nvPr>
+            <p:ph idx="1"/>
+            <p:extLst>
+              <p:ext uri="{D42A27DB-BD31-4B8C-83A1-F6EECF244321}">
+                <p14:modId xmlns:p14="http://schemas.microsoft.com/office/powerpoint/2010/main" val="1440678557"/>
+              </p:ext>
+            </p:extLst>
+          </p:nvPr>
+        </p:nvGraphicFramePr>
+        <p:xfrm>
+          <a:off x="457200" y="1600200"/>
+          <a:ext cx="7620000" cy="4302760"/>
+        </p:xfrm>
+        <a:graphic>
+          <a:graphicData uri="http://schemas.openxmlformats.org/drawingml/2006/table">
+            <a:tbl>
+              <a:tblPr firstRow="1" bandRow="1">
+                <a:tableStyleId>{5C22544A-7EE6-4342-B048-85BDC9FD1C3A}</a:tableStyleId>
+              </a:tblPr>
+              <a:tblGrid>
+                <a:gridCol w="2540000"/>
+                <a:gridCol w="2540000"/>
+                <a:gridCol w="2540000"/>
+              </a:tblGrid>
+              <a:tr h="370840">
+                <a:tc>
+                  <a:txBody>
+                    <a:bodyPr/>
+                    <a:lstStyle/>
+                    <a:p>
+                      <a:pPr algn="ctr"/>
+                      <a:r>
+                        <a:rPr lang="en-US" dirty="0" smtClean="0">
+                          <a:solidFill>
+                            <a:schemeClr val="tx1"/>
+                          </a:solidFill>
+                        </a:rPr>
+                        <a:t>Rev</a:t>
+                      </a:r>
+                      <a:r>
+                        <a:rPr lang="en-US" baseline="0" dirty="0" smtClean="0">
+                          <a:solidFill>
+                            <a:schemeClr val="tx1"/>
+                          </a:solidFill>
+                        </a:rPr>
+                        <a:t> 1:1</a:t>
+                      </a:r>
+                      <a:endParaRPr lang="en-US" dirty="0">
+                        <a:solidFill>
+                          <a:schemeClr val="tx1"/>
+                        </a:solidFill>
+                      </a:endParaRPr>
+                    </a:p>
+                  </a:txBody>
+                  <a:tcPr>
+                    <a:solidFill>
+                      <a:schemeClr val="bg1"/>
+                    </a:solidFill>
+                  </a:tcPr>
+                </a:tc>
+                <a:tc>
+                  <a:txBody>
+                    <a:bodyPr/>
+                    <a:lstStyle/>
+                    <a:p>
+                      <a:pPr algn="ctr"/>
+                      <a:r>
+                        <a:rPr lang="en-US" dirty="0" smtClean="0">
+                          <a:solidFill>
+                            <a:schemeClr val="tx1"/>
+                          </a:solidFill>
+                        </a:rPr>
+                        <a:t>Amos 3:7</a:t>
+                      </a:r>
+                      <a:endParaRPr lang="en-US" dirty="0">
+                        <a:solidFill>
+                          <a:schemeClr val="tx1"/>
+                        </a:solidFill>
+                      </a:endParaRPr>
+                    </a:p>
+                  </a:txBody>
+                  <a:tcPr>
+                    <a:solidFill>
+                      <a:schemeClr val="bg1"/>
+                    </a:solidFill>
+                  </a:tcPr>
+                </a:tc>
+                <a:tc>
+                  <a:txBody>
+                    <a:bodyPr/>
+                    <a:lstStyle/>
+                    <a:p>
+                      <a:pPr marL="0" marR="0" indent="0" algn="ctr" defTabSz="914400" rtl="0" eaLnBrk="1" fontAlgn="auto" latinLnBrk="0" hangingPunct="1">
+                        <a:lnSpc>
+                          <a:spcPct val="100000"/>
+                        </a:lnSpc>
+                        <a:spcBef>
+                          <a:spcPts val="0"/>
+                        </a:spcBef>
+                        <a:spcAft>
+                          <a:spcPts val="0"/>
+                        </a:spcAft>
+                        <a:buClrTx/>
+                        <a:buSzTx/>
+                        <a:buFontTx/>
+                        <a:buNone/>
+                        <a:tabLst/>
+                        <a:defRPr/>
+                      </a:pPr>
+                      <a:r>
+                        <a:rPr lang="en-US" dirty="0" smtClean="0">
+                          <a:solidFill>
+                            <a:schemeClr val="tx1"/>
+                          </a:solidFill>
+                        </a:rPr>
+                        <a:t>Dan 2:28, 45</a:t>
+                      </a:r>
+                    </a:p>
+                  </a:txBody>
+                  <a:tcPr>
+                    <a:solidFill>
+                      <a:schemeClr val="bg1"/>
+                    </a:solidFill>
+                  </a:tcPr>
+                </a:tc>
+              </a:tr>
+              <a:tr h="543560">
+                <a:tc>
+                  <a:txBody>
+                    <a:bodyPr/>
+                    <a:lstStyle/>
+                    <a:p>
+                      <a:pPr marL="114300" marR="0" indent="0" algn="l" defTabSz="914400" rtl="0" eaLnBrk="1" fontAlgn="auto" latinLnBrk="0" hangingPunct="1">
+                        <a:lnSpc>
+                          <a:spcPct val="100000"/>
+                        </a:lnSpc>
+                        <a:spcBef>
+                          <a:spcPts val="0"/>
+                        </a:spcBef>
+                        <a:spcAft>
+                          <a:spcPts val="0"/>
+                        </a:spcAft>
+                        <a:buClrTx/>
+                        <a:buSzTx/>
+                        <a:buFontTx/>
+                        <a:buNone/>
+                        <a:tabLst/>
+                        <a:defRPr/>
+                      </a:pPr>
+                      <a:r>
+                        <a:rPr lang="en-US" dirty="0" smtClean="0"/>
+                        <a:t>A </a:t>
+                      </a:r>
+                      <a:r>
+                        <a:rPr lang="en-US" dirty="0" smtClean="0">
+                          <a:solidFill>
+                            <a:srgbClr val="FF0000"/>
+                          </a:solidFill>
+                        </a:rPr>
+                        <a:t>revelation</a:t>
+                      </a:r>
+                      <a:r>
+                        <a:rPr lang="en-US" dirty="0" smtClean="0"/>
+                        <a:t> (</a:t>
+                      </a:r>
+                      <a:r>
+                        <a:rPr lang="el-GR" b="1" dirty="0" smtClean="0">
+                          <a:latin typeface="Times New Roman" panose="02020603050405020304" pitchFamily="18" charset="0"/>
+                          <a:cs typeface="Times New Roman" panose="02020603050405020304" pitchFamily="18" charset="0"/>
+                        </a:rPr>
+                        <a:t>Ἀποκάλυψις</a:t>
+                      </a:r>
+                      <a:r>
+                        <a:rPr lang="en-US" dirty="0" smtClean="0"/>
+                        <a:t>) of Jesus Christ which God granted to him to show </a:t>
+                      </a:r>
+                      <a:r>
+                        <a:rPr lang="en-US" dirty="0" smtClean="0">
+                          <a:solidFill>
+                            <a:srgbClr val="FF0000"/>
+                          </a:solidFill>
+                        </a:rPr>
+                        <a:t>to his servants </a:t>
+                      </a:r>
+                      <a:r>
+                        <a:rPr lang="en-US" dirty="0" smtClean="0">
+                          <a:solidFill>
+                            <a:schemeClr val="tx1"/>
+                          </a:solidFill>
+                          <a:latin typeface="Times New Roman" panose="02020603050405020304" pitchFamily="18" charset="0"/>
+                          <a:cs typeface="Times New Roman" panose="02020603050405020304" pitchFamily="18" charset="0"/>
+                        </a:rPr>
+                        <a:t>(</a:t>
+                      </a:r>
+                      <a:r>
+                        <a:rPr lang="el-GR" b="1" dirty="0" smtClean="0">
+                          <a:solidFill>
+                            <a:schemeClr val="tx1"/>
+                          </a:solidFill>
+                          <a:latin typeface="Times New Roman" panose="02020603050405020304" pitchFamily="18" charset="0"/>
+                          <a:cs typeface="Times New Roman" panose="02020603050405020304" pitchFamily="18" charset="0"/>
+                        </a:rPr>
+                        <a:t>τοῖς δούλοις αὐτοῦ</a:t>
+                      </a:r>
+                      <a:r>
+                        <a:rPr lang="en-US" b="1" dirty="0" smtClean="0">
+                          <a:solidFill>
+                            <a:schemeClr val="tx1"/>
+                          </a:solidFill>
+                          <a:latin typeface="Times New Roman" panose="02020603050405020304" pitchFamily="18" charset="0"/>
+                          <a:cs typeface="Times New Roman" panose="02020603050405020304" pitchFamily="18" charset="0"/>
+                        </a:rPr>
+                        <a:t>)</a:t>
+                      </a:r>
+                      <a:endParaRPr lang="en-US" dirty="0" smtClean="0">
+                        <a:solidFill>
+                          <a:schemeClr val="tx1"/>
+                        </a:solidFill>
+                        <a:latin typeface="Times New Roman" panose="02020603050405020304" pitchFamily="18" charset="0"/>
+                        <a:cs typeface="Times New Roman" panose="02020603050405020304" pitchFamily="18" charset="0"/>
+                      </a:endParaRPr>
+                    </a:p>
+                    <a:p>
+                      <a:pPr marL="114300" marR="0" indent="0" algn="l" defTabSz="914400" rtl="0" eaLnBrk="1" fontAlgn="auto" latinLnBrk="0" hangingPunct="1">
+                        <a:lnSpc>
+                          <a:spcPct val="100000"/>
+                        </a:lnSpc>
+                        <a:spcBef>
+                          <a:spcPts val="0"/>
+                        </a:spcBef>
+                        <a:spcAft>
+                          <a:spcPts val="0"/>
+                        </a:spcAft>
+                        <a:buClrTx/>
+                        <a:buSzTx/>
+                        <a:buFontTx/>
+                        <a:buNone/>
+                        <a:tabLst/>
+                        <a:defRPr/>
+                      </a:pPr>
+                      <a:r>
+                        <a:rPr lang="en-US" dirty="0" smtClean="0">
+                          <a:solidFill>
+                            <a:srgbClr val="FF0000"/>
+                          </a:solidFill>
+                        </a:rPr>
+                        <a:t>the things which must happen </a:t>
+                      </a:r>
+                      <a:r>
+                        <a:rPr lang="en-US" dirty="0" smtClean="0"/>
+                        <a:t>(</a:t>
+                      </a:r>
+                      <a:r>
+                        <a:rPr lang="el-GR" b="1" dirty="0" smtClean="0">
+                          <a:latin typeface="Times New Roman" panose="02020603050405020304" pitchFamily="18" charset="0"/>
+                          <a:cs typeface="Times New Roman" panose="02020603050405020304" pitchFamily="18" charset="0"/>
+                        </a:rPr>
+                        <a:t>ἃ δεῖ γενέσθαι</a:t>
+                      </a:r>
+                      <a:r>
+                        <a:rPr lang="en-US" dirty="0" smtClean="0"/>
+                        <a:t>) soon, and he </a:t>
+                      </a:r>
+                      <a:r>
+                        <a:rPr lang="en-US" dirty="0" smtClean="0">
+                          <a:solidFill>
+                            <a:srgbClr val="FF0000"/>
+                          </a:solidFill>
+                        </a:rPr>
+                        <a:t>made it known</a:t>
+                      </a:r>
+                      <a:r>
+                        <a:rPr lang="en-US" dirty="0" smtClean="0"/>
+                        <a:t> (</a:t>
+                      </a:r>
+                      <a:r>
+                        <a:rPr lang="el-GR" b="1" dirty="0" smtClean="0">
+                          <a:latin typeface="Times New Roman" panose="02020603050405020304" pitchFamily="18" charset="0"/>
+                          <a:cs typeface="Times New Roman" panose="02020603050405020304" pitchFamily="18" charset="0"/>
+                        </a:rPr>
+                        <a:t>ἐσήμανεν</a:t>
+                      </a:r>
+                      <a:r>
+                        <a:rPr lang="en-US" b="1" dirty="0" smtClean="0">
+                          <a:latin typeface="Times New Roman" panose="02020603050405020304" pitchFamily="18" charset="0"/>
+                          <a:cs typeface="Times New Roman" panose="02020603050405020304" pitchFamily="18" charset="0"/>
+                        </a:rPr>
+                        <a:t>) </a:t>
+                      </a:r>
+                      <a:r>
+                        <a:rPr lang="en-US" dirty="0" smtClean="0"/>
+                        <a:t>by sending his angle to his servant John…</a:t>
+                      </a:r>
+                    </a:p>
+                    <a:p>
+                      <a:pPr marL="114300" indent="0">
+                        <a:buNone/>
+                      </a:pPr>
+                      <a:endParaRPr lang="en-US" dirty="0" smtClean="0"/>
+                    </a:p>
+                  </a:txBody>
+                  <a:tcPr>
+                    <a:solidFill>
+                      <a:schemeClr val="bg1"/>
+                    </a:solidFill>
+                  </a:tcPr>
+                </a:tc>
+                <a:tc>
+                  <a:txBody>
+                    <a:bodyPr/>
+                    <a:lstStyle/>
+                    <a:p>
+                      <a:pPr marL="0" marR="0" indent="0" algn="l" defTabSz="914400" rtl="0" eaLnBrk="1" fontAlgn="auto" latinLnBrk="0" hangingPunct="1">
+                        <a:lnSpc>
+                          <a:spcPct val="100000"/>
+                        </a:lnSpc>
+                        <a:spcBef>
+                          <a:spcPts val="0"/>
+                        </a:spcBef>
+                        <a:spcAft>
+                          <a:spcPts val="0"/>
+                        </a:spcAft>
+                        <a:buClrTx/>
+                        <a:buSzTx/>
+                        <a:buFontTx/>
+                        <a:buNone/>
+                        <a:tabLst/>
+                        <a:defRPr/>
+                      </a:pPr>
+                      <a:r>
+                        <a:rPr lang="en-US" dirty="0" smtClean="0"/>
+                        <a:t>Surely the Lord GOD does nothing, without </a:t>
+                      </a:r>
+                      <a:r>
+                        <a:rPr lang="en-US" dirty="0" smtClean="0">
+                          <a:solidFill>
+                            <a:srgbClr val="FF0000"/>
+                          </a:solidFill>
+                        </a:rPr>
+                        <a:t>revealing</a:t>
+                      </a:r>
+                      <a:r>
+                        <a:rPr lang="en-US" dirty="0" smtClean="0"/>
+                        <a:t> (</a:t>
+                      </a:r>
+                      <a:r>
+                        <a:rPr lang="el-GR" b="1" dirty="0" smtClean="0">
+                          <a:latin typeface="Times New Roman" panose="02020603050405020304" pitchFamily="18" charset="0"/>
+                          <a:cs typeface="Times New Roman" panose="02020603050405020304" pitchFamily="18" charset="0"/>
+                        </a:rPr>
+                        <a:t>ἀποκαλύψῃ</a:t>
+                      </a:r>
+                      <a:r>
+                        <a:rPr lang="en-US" dirty="0" smtClean="0">
+                          <a:latin typeface="Times New Roman" panose="02020603050405020304" pitchFamily="18" charset="0"/>
+                          <a:cs typeface="Times New Roman" panose="02020603050405020304" pitchFamily="18" charset="0"/>
+                        </a:rPr>
+                        <a:t>) </a:t>
+                      </a:r>
+                      <a:r>
+                        <a:rPr lang="en-US" dirty="0" smtClean="0"/>
+                        <a:t>his secret </a:t>
+                      </a:r>
+                      <a:r>
+                        <a:rPr lang="en-US" dirty="0" smtClean="0">
+                          <a:solidFill>
+                            <a:srgbClr val="FF0000"/>
+                          </a:solidFill>
+                        </a:rPr>
+                        <a:t>to his servants </a:t>
+                      </a:r>
+                      <a:r>
+                        <a:rPr lang="en-US" dirty="0" smtClean="0">
+                          <a:solidFill>
+                            <a:schemeClr val="tx1"/>
+                          </a:solidFill>
+                          <a:latin typeface="Times New Roman" panose="02020603050405020304" pitchFamily="18" charset="0"/>
+                          <a:cs typeface="Times New Roman" panose="02020603050405020304" pitchFamily="18" charset="0"/>
+                        </a:rPr>
+                        <a:t>(</a:t>
+                      </a:r>
+                      <a:r>
+                        <a:rPr lang="el-GR" sz="1800" b="1" i="0" u="none" strike="noStrike" kern="1200" baseline="0" dirty="0" smtClean="0">
+                          <a:solidFill>
+                            <a:schemeClr val="dk1"/>
+                          </a:solidFill>
+                          <a:latin typeface="Times New Roman" panose="02020603050405020304" pitchFamily="18" charset="0"/>
+                          <a:ea typeface="+mn-ea"/>
+                          <a:cs typeface="Times New Roman" panose="02020603050405020304" pitchFamily="18" charset="0"/>
+                        </a:rPr>
+                        <a:t>τοὺς δούλους αὐτοῦ</a:t>
+                      </a:r>
+                      <a:r>
+                        <a:rPr lang="en-US" sz="1800" b="0" i="0" u="none" strike="noStrike" kern="1200" baseline="0" dirty="0" smtClean="0">
+                          <a:solidFill>
+                            <a:schemeClr val="dk1"/>
+                          </a:solidFill>
+                          <a:latin typeface="+mn-lt"/>
+                          <a:ea typeface="+mn-ea"/>
+                          <a:cs typeface="+mn-cs"/>
+                        </a:rPr>
+                        <a:t>) </a:t>
+                      </a:r>
+                      <a:r>
+                        <a:rPr lang="en-US" dirty="0" smtClean="0"/>
+                        <a:t>the prophets. (Amos 3:7 NRSV)</a:t>
+                      </a:r>
+                    </a:p>
+                    <a:p>
+                      <a:endParaRPr lang="en-US" dirty="0" smtClean="0"/>
+                    </a:p>
+                    <a:p>
+                      <a:endParaRPr lang="en-US" dirty="0"/>
+                    </a:p>
+                  </a:txBody>
+                  <a:tcPr>
+                    <a:solidFill>
+                      <a:schemeClr val="bg1"/>
+                    </a:solidFill>
+                  </a:tcPr>
+                </a:tc>
+                <a:tc>
+                  <a:txBody>
+                    <a:bodyPr/>
+                    <a:lstStyle/>
+                    <a:p>
+                      <a:pPr marL="0" marR="0" indent="0" algn="l" defTabSz="914400" rtl="0" eaLnBrk="1" fontAlgn="auto" latinLnBrk="0" hangingPunct="1">
+                        <a:lnSpc>
+                          <a:spcPct val="100000"/>
+                        </a:lnSpc>
+                        <a:spcBef>
+                          <a:spcPts val="0"/>
+                        </a:spcBef>
+                        <a:spcAft>
+                          <a:spcPts val="0"/>
+                        </a:spcAft>
+                        <a:buClrTx/>
+                        <a:buSzTx/>
+                        <a:buFontTx/>
+                        <a:buNone/>
+                        <a:tabLst/>
+                        <a:defRPr/>
+                      </a:pPr>
+                      <a:r>
+                        <a:rPr lang="en-US" dirty="0" smtClean="0"/>
+                        <a:t>but there is a God in heaven who reveals mysteries, and he has disclosed to King Nebuchadnezzar </a:t>
+                      </a:r>
+                      <a:r>
+                        <a:rPr lang="en-US" dirty="0" smtClean="0">
+                          <a:solidFill>
+                            <a:srgbClr val="FF0000"/>
+                          </a:solidFill>
+                        </a:rPr>
+                        <a:t>what will happen </a:t>
+                      </a:r>
+                      <a:r>
+                        <a:rPr lang="en-US" dirty="0" smtClean="0"/>
+                        <a:t>(</a:t>
+                      </a:r>
+                      <a:r>
+                        <a:rPr lang="el-GR" b="1" dirty="0" smtClean="0">
+                          <a:latin typeface="Times New Roman" panose="02020603050405020304" pitchFamily="18" charset="0"/>
+                          <a:cs typeface="Times New Roman" panose="02020603050405020304" pitchFamily="18" charset="0"/>
+                        </a:rPr>
+                        <a:t>ἃ δεῖ γενέσθαι</a:t>
+                      </a:r>
+                      <a:r>
+                        <a:rPr lang="en-US" dirty="0" smtClean="0"/>
+                        <a:t>) at the end of days…. The great God has </a:t>
+                      </a:r>
+                      <a:r>
+                        <a:rPr lang="en-US" dirty="0" smtClean="0">
+                          <a:solidFill>
+                            <a:srgbClr val="FF0000"/>
+                          </a:solidFill>
+                        </a:rPr>
+                        <a:t>informed</a:t>
+                      </a:r>
+                      <a:r>
+                        <a:rPr lang="en-US" dirty="0" smtClean="0"/>
+                        <a:t> (</a:t>
+                      </a:r>
+                      <a:r>
+                        <a:rPr lang="el-GR" b="1" dirty="0" smtClean="0">
+                          <a:latin typeface="Times New Roman" panose="02020603050405020304" pitchFamily="18" charset="0"/>
+                          <a:cs typeface="Times New Roman" panose="02020603050405020304" pitchFamily="18" charset="0"/>
+                        </a:rPr>
+                        <a:t>ἐσήμανεν</a:t>
+                      </a:r>
+                      <a:r>
+                        <a:rPr lang="en-US" b="1" dirty="0" smtClean="0"/>
+                        <a:t>)</a:t>
+                      </a:r>
+                      <a:r>
+                        <a:rPr lang="en-US" dirty="0" smtClean="0"/>
+                        <a:t> the king what shall be hereafter. The dream is certain, and its interpretation trustworthy." (</a:t>
+                      </a:r>
+                    </a:p>
+                    <a:p>
+                      <a:endParaRPr lang="en-US" dirty="0"/>
+                    </a:p>
+                  </a:txBody>
+                  <a:tcPr>
+                    <a:solidFill>
+                      <a:schemeClr val="bg1"/>
+                    </a:solidFill>
+                  </a:tcPr>
+                </a:tc>
+              </a:tr>
+            </a:tbl>
+          </a:graphicData>
+        </a:graphic>
+      </p:graphicFrame>
+      <p:sp>
+        <p:nvSpPr>
+          <p:cNvPr id="4" name="Footer Placeholder 3"/>
+          <p:cNvSpPr>
+            <a:spLocks noGrp="1"/>
+          </p:cNvSpPr>
+          <p:nvPr>
+            <p:ph type="ftr" sz="quarter" idx="11"/>
+          </p:nvPr>
+        </p:nvSpPr>
+        <p:spPr/>
+        <p:txBody>
+          <a:bodyPr/>
+          <a:lstStyle/>
+          <a:p>
+            <a:r>
+              <a:rPr lang="en-US" smtClean="0"/>
+              <a:t>Encoding Apocalypse and Empire</a:t>
+            </a:r>
+            <a:endParaRPr lang="en-US"/>
+          </a:p>
+        </p:txBody>
+      </p:sp>
+      <p:sp>
+        <p:nvSpPr>
+          <p:cNvPr id="5" name="Slide Number Placeholder 4"/>
+          <p:cNvSpPr>
+            <a:spLocks noGrp="1"/>
+          </p:cNvSpPr>
+          <p:nvPr>
+            <p:ph type="sldNum" sz="quarter" idx="12"/>
+          </p:nvPr>
+        </p:nvSpPr>
+        <p:spPr/>
+        <p:txBody>
+          <a:bodyPr/>
+          <a:lstStyle/>
+          <a:p>
+            <a:fld id="{B54884B7-6C20-497E-907D-B5AAC07785D1}" type="slidenum">
+              <a:rPr lang="en-US" smtClean="0"/>
+              <a:t>10</a:t>
+            </a:fld>
+            <a:endParaRPr lang="en-US"/>
+          </a:p>
+        </p:txBody>
+      </p:sp>
+    </p:spTree>
+    <p:extLst>
+      <p:ext uri="{BB962C8B-B14F-4D97-AF65-F5344CB8AC3E}">
+        <p14:creationId xmlns:p14="http://schemas.microsoft.com/office/powerpoint/2010/main" val="893997241"/>
+      </p:ext>
+    </p:extLst>
+  </p:cSld>
+  <p:clrMapOvr>
+    <a:masterClrMapping/>
+  </p:clrMapOvr>
+</p:sld>
+</file>
+
+<file path=ppt/slides/slide11.xml><?xml version="1.0" encoding="utf-8"?>
+<p:sld xmlns:a="http://schemas.openxmlformats.org/drawingml/2006/main" xmlns:r="http://schemas.openxmlformats.org/officeDocument/2006/relationships" xmlns:p="http://schemas.openxmlformats.org/presentationml/2006/main">
+  <p:cSld>
+    <p:spTree>
+      <p:nvGrpSpPr>
+        <p:cNvPr id="1" name=""/>
+        <p:cNvGrpSpPr/>
+        <p:nvPr/>
+      </p:nvGrpSpPr>
+      <p:grpSpPr>
+        <a:xfrm>
+          <a:off x="0" y="0"/>
+          <a:ext cx="0" cy="0"/>
+          <a:chOff x="0" y="0"/>
+          <a:chExt cx="0" cy="0"/>
+        </a:xfrm>
+      </p:grpSpPr>
+      <p:sp>
+        <p:nvSpPr>
+          <p:cNvPr id="2" name="Title 1"/>
+          <p:cNvSpPr>
+            <a:spLocks noGrp="1"/>
+          </p:cNvSpPr>
+          <p:nvPr>
+            <p:ph type="title"/>
+          </p:nvPr>
+        </p:nvSpPr>
+        <p:spPr/>
+        <p:txBody>
           <a:bodyPr/>
           <a:lstStyle/>
           <a:p>
@@ -4564,7 +5177,7 @@
           <a:p>
             <a:fld id="{B54884B7-6C20-497E-907D-B5AAC07785D1}" type="slidenum">
               <a:rPr lang="en-US" smtClean="0"/>
-              <a:t>10</a:t>
+              <a:t>11</a:t>
             </a:fld>
             <a:endParaRPr lang="en-US"/>
           </a:p>
@@ -4590,7 +5203,7 @@
 </p:sld>
 </file>
 
-<file path=ppt/slides/slide11.xml><?xml version="1.0" encoding="utf-8"?>
+<file path=ppt/slides/slide12.xml><?xml version="1.0" encoding="utf-8"?>
 <p:sld xmlns:a="http://schemas.openxmlformats.org/drawingml/2006/main" xmlns:r="http://schemas.openxmlformats.org/officeDocument/2006/relationships" xmlns:p="http://schemas.openxmlformats.org/presentationml/2006/main">
   <p:cSld>
     <p:spTree>
@@ -4629,11 +5242,7 @@
           <a:p>
             <a:r>
               <a:rPr lang="en-US" dirty="0" smtClean="0"/>
-              <a:t>Enumerated </a:t>
-            </a:r>
-            <a:r>
-              <a:rPr lang="en-US" dirty="0" smtClean="0"/>
-              <a:t>Allusions </a:t>
+              <a:t>Enumerated Allusions </a:t>
             </a:r>
             <a:endParaRPr lang="en-US" dirty="0"/>
           </a:p>
@@ -4704,7 +5313,7 @@
           <a:p>
             <a:fld id="{B54884B7-6C20-497E-907D-B5AAC07785D1}" type="slidenum">
               <a:rPr lang="en-US" smtClean="0"/>
-              <a:t>11</a:t>
+              <a:t>12</a:t>
             </a:fld>
             <a:endParaRPr lang="en-US"/>
           </a:p>
@@ -4730,7 +5339,7 @@
 </p:sld>
 </file>
 
-<file path=ppt/slides/slide12.xml><?xml version="1.0" encoding="utf-8"?>
+<file path=ppt/slides/slide13.xml><?xml version="1.0" encoding="utf-8"?>
 <p:sld xmlns:a="http://schemas.openxmlformats.org/drawingml/2006/main" xmlns:r="http://schemas.openxmlformats.org/officeDocument/2006/relationships" xmlns:p="http://schemas.openxmlformats.org/presentationml/2006/main">
   <p:cSld>
     <p:spTree>
@@ -4864,7 +5473,7 @@
           <a:p>
             <a:fld id="{B54884B7-6C20-497E-907D-B5AAC07785D1}" type="slidenum">
               <a:rPr lang="en-US" smtClean="0"/>
-              <a:t>12</a:t>
+              <a:t>13</a:t>
             </a:fld>
             <a:endParaRPr lang="en-US"/>
           </a:p>
@@ -4874,178 +5483,6 @@
     <p:extLst>
       <p:ext uri="{BB962C8B-B14F-4D97-AF65-F5344CB8AC3E}">
         <p14:creationId xmlns:p14="http://schemas.microsoft.com/office/powerpoint/2010/main" val="3852568507"/>
-      </p:ext>
-    </p:extLst>
-  </p:cSld>
-  <p:clrMapOvr>
-    <a:masterClrMapping/>
-  </p:clrMapOvr>
-  <p:timing>
-    <p:tnLst>
-      <p:par>
-        <p:cTn id="1" dur="indefinite" restart="never" nodeType="tmRoot"/>
-      </p:par>
-    </p:tnLst>
-  </p:timing>
-</p:sld>
-</file>
-
-<file path=ppt/slides/slide13.xml><?xml version="1.0" encoding="utf-8"?>
-<p:sld xmlns:a="http://schemas.openxmlformats.org/drawingml/2006/main" xmlns:r="http://schemas.openxmlformats.org/officeDocument/2006/relationships" xmlns:p="http://schemas.openxmlformats.org/presentationml/2006/main">
-  <p:cSld>
-    <p:spTree>
-      <p:nvGrpSpPr>
-        <p:cNvPr id="1" name=""/>
-        <p:cNvGrpSpPr/>
-        <p:nvPr/>
-      </p:nvGrpSpPr>
-      <p:grpSpPr>
-        <a:xfrm>
-          <a:off x="0" y="0"/>
-          <a:ext cx="0" cy="0"/>
-          <a:chOff x="0" y="0"/>
-          <a:chExt cx="0" cy="0"/>
-        </a:xfrm>
-      </p:grpSpPr>
-      <p:sp>
-        <p:nvSpPr>
-          <p:cNvPr id="4" name="Title 3"/>
-          <p:cNvSpPr>
-            <a:spLocks noGrp="1"/>
-          </p:cNvSpPr>
-          <p:nvPr>
-            <p:ph type="title"/>
-          </p:nvPr>
-        </p:nvSpPr>
-        <p:spPr/>
-        <p:txBody>
-          <a:bodyPr/>
-          <a:lstStyle/>
-          <a:p>
-            <a:r>
-              <a:rPr lang="en-US" dirty="0" smtClean="0"/>
-              <a:t>SBLGNT and NA</a:t>
-            </a:r>
-            <a:r>
-              <a:rPr lang="en-US" baseline="30000" dirty="0" smtClean="0"/>
-              <a:t>28</a:t>
-            </a:r>
-            <a:r>
-              <a:rPr lang="en-US" dirty="0" smtClean="0"/>
-              <a:t> Online</a:t>
-            </a:r>
-            <a:endParaRPr lang="en-US" baseline="30000" dirty="0"/>
-          </a:p>
-        </p:txBody>
-      </p:sp>
-      <p:pic>
-        <p:nvPicPr>
-          <p:cNvPr id="8" name="Content Placeholder 7"/>
-          <p:cNvPicPr>
-            <a:picLocks noGrp="1" noChangeAspect="1"/>
-          </p:cNvPicPr>
-          <p:nvPr>
-            <p:ph sz="half" idx="1"/>
-          </p:nvPr>
-        </p:nvPicPr>
-        <p:blipFill>
-          <a:blip r:embed="rId2">
-            <a:extLst>
-              <a:ext uri="{28A0092B-C50C-407E-A947-70E740481C1C}">
-                <a14:useLocalDpi xmlns:a14="http://schemas.microsoft.com/office/drawing/2010/main" val="0"/>
-              </a:ext>
-            </a:extLst>
-          </a:blip>
-          <a:stretch>
-            <a:fillRect/>
-          </a:stretch>
-        </p:blipFill>
-        <p:spPr>
-          <a:xfrm>
-            <a:off x="457200" y="1981060"/>
-            <a:ext cx="3657600" cy="3700743"/>
-          </a:xfrm>
-        </p:spPr>
-      </p:pic>
-      <p:pic>
-        <p:nvPicPr>
-          <p:cNvPr id="7" name="Content Placeholder 6"/>
-          <p:cNvPicPr>
-            <a:picLocks noGrp="1" noChangeAspect="1"/>
-          </p:cNvPicPr>
-          <p:nvPr>
-            <p:ph sz="half" idx="2"/>
-          </p:nvPr>
-        </p:nvPicPr>
-        <p:blipFill>
-          <a:blip r:embed="rId3">
-            <a:extLst>
-              <a:ext uri="{28A0092B-C50C-407E-A947-70E740481C1C}">
-                <a14:useLocalDpi xmlns:a14="http://schemas.microsoft.com/office/drawing/2010/main" val="0"/>
-              </a:ext>
-            </a:extLst>
-          </a:blip>
-          <a:stretch>
-            <a:fillRect/>
-          </a:stretch>
-        </p:blipFill>
-        <p:spPr>
-          <a:xfrm>
-            <a:off x="4419600" y="1904769"/>
-            <a:ext cx="3657600" cy="3853324"/>
-          </a:xfrm>
-        </p:spPr>
-      </p:pic>
-      <p:sp>
-        <p:nvSpPr>
-          <p:cNvPr id="2" name="Footer Placeholder 1"/>
-          <p:cNvSpPr>
-            <a:spLocks noGrp="1"/>
-          </p:cNvSpPr>
-          <p:nvPr>
-            <p:ph type="ftr" sz="quarter" idx="11"/>
-          </p:nvPr>
-        </p:nvSpPr>
-        <p:spPr/>
-        <p:txBody>
-          <a:bodyPr/>
-          <a:lstStyle/>
-          <a:p>
-            <a:r>
-              <a:rPr lang="en-US" smtClean="0"/>
-              <a:t>Encoding Apocalypse and Empire</a:t>
-            </a:r>
-            <a:endParaRPr lang="en-US"/>
-          </a:p>
-        </p:txBody>
-      </p:sp>
-      <p:sp>
-        <p:nvSpPr>
-          <p:cNvPr id="3" name="Slide Number Placeholder 2"/>
-          <p:cNvSpPr>
-            <a:spLocks noGrp="1"/>
-          </p:cNvSpPr>
-          <p:nvPr>
-            <p:ph type="sldNum" sz="quarter" idx="12"/>
-          </p:nvPr>
-        </p:nvSpPr>
-        <p:spPr/>
-        <p:txBody>
-          <a:bodyPr/>
-          <a:lstStyle/>
-          <a:p>
-            <a:fld id="{B54884B7-6C20-497E-907D-B5AAC07785D1}" type="slidenum">
-              <a:rPr lang="en-US" smtClean="0"/>
-              <a:t>13</a:t>
-            </a:fld>
-            <a:endParaRPr lang="en-US"/>
-          </a:p>
-        </p:txBody>
-      </p:sp>
-    </p:spTree>
-    <p:extLst>
-      <p:ext uri="{BB962C8B-B14F-4D97-AF65-F5344CB8AC3E}">
-        <p14:creationId xmlns:p14="http://schemas.microsoft.com/office/powerpoint/2010/main" val="2982528296"/>
       </p:ext>
     </p:extLst>
   </p:cSld>
@@ -5081,7 +5518,7 @@
       </p:grpSpPr>
       <p:sp>
         <p:nvSpPr>
-          <p:cNvPr id="5" name="Title 4"/>
+          <p:cNvPr id="4" name="Title 3"/>
           <p:cNvSpPr>
             <a:spLocks noGrp="1"/>
           </p:cNvSpPr>
@@ -5096,20 +5533,86 @@
           <a:p>
             <a:r>
               <a:rPr lang="en-US" dirty="0" smtClean="0"/>
-              <a:t>Merchants of the Earth</a:t>
-            </a:r>
-            <a:endParaRPr lang="en-US" dirty="0"/>
-          </a:p>
-        </p:txBody>
-      </p:sp>
-      <p:sp>
-        <p:nvSpPr>
-          <p:cNvPr id="6" name="Content Placeholder 5"/>
-          <p:cNvSpPr>
-            <a:spLocks noGrp="1"/>
-          </p:cNvSpPr>
-          <p:nvPr>
-            <p:ph idx="1"/>
+              <a:t>SBLGNT and NA</a:t>
+            </a:r>
+            <a:r>
+              <a:rPr lang="en-US" baseline="30000" dirty="0" smtClean="0"/>
+              <a:t>28</a:t>
+            </a:r>
+            <a:r>
+              <a:rPr lang="en-US" dirty="0" smtClean="0"/>
+              <a:t> Online</a:t>
+            </a:r>
+            <a:endParaRPr lang="en-US" baseline="30000" dirty="0"/>
+          </a:p>
+        </p:txBody>
+      </p:sp>
+      <p:pic>
+        <p:nvPicPr>
+          <p:cNvPr id="8" name="Content Placeholder 7"/>
+          <p:cNvPicPr>
+            <a:picLocks noGrp="1" noChangeAspect="1"/>
+          </p:cNvPicPr>
+          <p:nvPr>
+            <p:ph sz="half" idx="1"/>
+          </p:nvPr>
+        </p:nvPicPr>
+        <p:blipFill>
+          <a:blip r:embed="rId2">
+            <a:extLst>
+              <a:ext uri="{28A0092B-C50C-407E-A947-70E740481C1C}">
+                <a14:useLocalDpi xmlns:a14="http://schemas.microsoft.com/office/drawing/2010/main" val="0"/>
+              </a:ext>
+            </a:extLst>
+          </a:blip>
+          <a:stretch>
+            <a:fillRect/>
+          </a:stretch>
+        </p:blipFill>
+        <p:spPr>
+          <a:xfrm>
+            <a:off x="457200" y="1981060"/>
+            <a:ext cx="3657600" cy="3700743"/>
+          </a:xfrm>
+        </p:spPr>
+      </p:pic>
+      <p:pic>
+        <p:nvPicPr>
+          <p:cNvPr id="7" name="Content Placeholder 6"/>
+          <p:cNvPicPr>
+            <a:picLocks noGrp="1" noChangeAspect="1"/>
+          </p:cNvPicPr>
+          <p:nvPr>
+            <p:ph sz="half" idx="2"/>
+          </p:nvPr>
+        </p:nvPicPr>
+        <p:blipFill>
+          <a:blip r:embed="rId3">
+            <a:extLst>
+              <a:ext uri="{28A0092B-C50C-407E-A947-70E740481C1C}">
+                <a14:useLocalDpi xmlns:a14="http://schemas.microsoft.com/office/drawing/2010/main" val="0"/>
+              </a:ext>
+            </a:extLst>
+          </a:blip>
+          <a:stretch>
+            <a:fillRect/>
+          </a:stretch>
+        </p:blipFill>
+        <p:spPr>
+          <a:xfrm>
+            <a:off x="4419600" y="1904769"/>
+            <a:ext cx="3657600" cy="3853324"/>
+          </a:xfrm>
+        </p:spPr>
+      </p:pic>
+      <p:sp>
+        <p:nvSpPr>
+          <p:cNvPr id="2" name="Footer Placeholder 1"/>
+          <p:cNvSpPr>
+            <a:spLocks noGrp="1"/>
+          </p:cNvSpPr>
+          <p:nvPr>
+            <p:ph type="ftr" sz="quarter" idx="11"/>
           </p:nvPr>
         </p:nvSpPr>
         <p:spPr/>
@@ -5118,41 +5621,6 @@
           <a:lstStyle/>
           <a:p>
             <a:r>
-              <a:rPr lang="en-US" dirty="0" smtClean="0"/>
-              <a:t>Bible Works $359</a:t>
-            </a:r>
-          </a:p>
-          <a:p>
-            <a:r>
-              <a:rPr lang="en-US" dirty="0" smtClean="0"/>
-              <a:t>Accordance $299</a:t>
-            </a:r>
-          </a:p>
-          <a:p>
-            <a:r>
-              <a:rPr lang="en-US" dirty="0" smtClean="0"/>
-              <a:t>Logos $ -- networks down</a:t>
-            </a:r>
-            <a:endParaRPr lang="en-US" dirty="0"/>
-          </a:p>
-        </p:txBody>
-      </p:sp>
-      <p:sp>
-        <p:nvSpPr>
-          <p:cNvPr id="7" name="Footer Placeholder 6"/>
-          <p:cNvSpPr>
-            <a:spLocks noGrp="1"/>
-          </p:cNvSpPr>
-          <p:nvPr>
-            <p:ph type="ftr" sz="quarter" idx="11"/>
-          </p:nvPr>
-        </p:nvSpPr>
-        <p:spPr/>
-        <p:txBody>
-          <a:bodyPr/>
-          <a:lstStyle/>
-          <a:p>
-            <a:r>
               <a:rPr lang="en-US" smtClean="0"/>
               <a:t>Encoding Apocalypse and Empire</a:t>
             </a:r>
@@ -5162,7 +5630,7 @@
       </p:sp>
       <p:sp>
         <p:nvSpPr>
-          <p:cNvPr id="8" name="Slide Number Placeholder 7"/>
+          <p:cNvPr id="3" name="Slide Number Placeholder 2"/>
           <p:cNvSpPr>
             <a:spLocks noGrp="1"/>
           </p:cNvSpPr>
@@ -5186,13 +5654,20 @@
     </p:spTree>
     <p:extLst>
       <p:ext uri="{BB962C8B-B14F-4D97-AF65-F5344CB8AC3E}">
-        <p14:creationId xmlns:p14="http://schemas.microsoft.com/office/powerpoint/2010/main" val="2157431465"/>
+        <p14:creationId xmlns:p14="http://schemas.microsoft.com/office/powerpoint/2010/main" val="2982528296"/>
       </p:ext>
     </p:extLst>
   </p:cSld>
   <p:clrMapOvr>
     <a:masterClrMapping/>
   </p:clrMapOvr>
+  <p:timing>
+    <p:tnLst>
+      <p:par>
+        <p:cTn id="1" dur="indefinite" restart="never" nodeType="tmRoot"/>
+      </p:par>
+    </p:tnLst>
+  </p:timing>
 </p:sld>
 </file>
 
@@ -5215,6 +5690,144 @@
       </p:grpSpPr>
       <p:sp>
         <p:nvSpPr>
+          <p:cNvPr id="5" name="Title 4"/>
+          <p:cNvSpPr>
+            <a:spLocks noGrp="1"/>
+          </p:cNvSpPr>
+          <p:nvPr>
+            <p:ph type="title"/>
+          </p:nvPr>
+        </p:nvSpPr>
+        <p:spPr/>
+        <p:txBody>
+          <a:bodyPr/>
+          <a:lstStyle/>
+          <a:p>
+            <a:r>
+              <a:rPr lang="en-US" dirty="0" smtClean="0"/>
+              <a:t>Merchants of the Earth</a:t>
+            </a:r>
+            <a:endParaRPr lang="en-US" dirty="0"/>
+          </a:p>
+        </p:txBody>
+      </p:sp>
+      <p:sp>
+        <p:nvSpPr>
+          <p:cNvPr id="6" name="Content Placeholder 5"/>
+          <p:cNvSpPr>
+            <a:spLocks noGrp="1"/>
+          </p:cNvSpPr>
+          <p:nvPr>
+            <p:ph idx="1"/>
+          </p:nvPr>
+        </p:nvSpPr>
+        <p:spPr/>
+        <p:txBody>
+          <a:bodyPr/>
+          <a:lstStyle/>
+          <a:p>
+            <a:r>
+              <a:rPr lang="en-US" dirty="0" smtClean="0"/>
+              <a:t>Bible Works $359</a:t>
+            </a:r>
+          </a:p>
+          <a:p>
+            <a:r>
+              <a:rPr lang="en-US" dirty="0" smtClean="0"/>
+              <a:t>Accordance $299</a:t>
+            </a:r>
+          </a:p>
+          <a:p>
+            <a:r>
+              <a:rPr lang="en-US" dirty="0" smtClean="0"/>
+              <a:t>Logos $ -- networks </a:t>
+            </a:r>
+            <a:r>
+              <a:rPr lang="en-US" dirty="0" smtClean="0"/>
+              <a:t>down for SBL?</a:t>
+            </a:r>
+            <a:endParaRPr lang="en-US" dirty="0"/>
+          </a:p>
+        </p:txBody>
+      </p:sp>
+      <p:sp>
+        <p:nvSpPr>
+          <p:cNvPr id="7" name="Footer Placeholder 6"/>
+          <p:cNvSpPr>
+            <a:spLocks noGrp="1"/>
+          </p:cNvSpPr>
+          <p:nvPr>
+            <p:ph type="ftr" sz="quarter" idx="11"/>
+          </p:nvPr>
+        </p:nvSpPr>
+        <p:spPr/>
+        <p:txBody>
+          <a:bodyPr/>
+          <a:lstStyle/>
+          <a:p>
+            <a:r>
+              <a:rPr lang="en-US" smtClean="0"/>
+              <a:t>Encoding Apocalypse and Empire</a:t>
+            </a:r>
+            <a:endParaRPr lang="en-US"/>
+          </a:p>
+        </p:txBody>
+      </p:sp>
+      <p:sp>
+        <p:nvSpPr>
+          <p:cNvPr id="8" name="Slide Number Placeholder 7"/>
+          <p:cNvSpPr>
+            <a:spLocks noGrp="1"/>
+          </p:cNvSpPr>
+          <p:nvPr>
+            <p:ph type="sldNum" sz="quarter" idx="12"/>
+          </p:nvPr>
+        </p:nvSpPr>
+        <p:spPr/>
+        <p:txBody>
+          <a:bodyPr/>
+          <a:lstStyle/>
+          <a:p>
+            <a:fld id="{B54884B7-6C20-497E-907D-B5AAC07785D1}" type="slidenum">
+              <a:rPr lang="en-US" smtClean="0"/>
+              <a:t>15</a:t>
+            </a:fld>
+            <a:endParaRPr lang="en-US"/>
+          </a:p>
+        </p:txBody>
+      </p:sp>
+    </p:spTree>
+    <p:extLst>
+      <p:ext uri="{BB962C8B-B14F-4D97-AF65-F5344CB8AC3E}">
+        <p14:creationId xmlns:p14="http://schemas.microsoft.com/office/powerpoint/2010/main" val="2157431465"/>
+      </p:ext>
+    </p:extLst>
+  </p:cSld>
+  <p:clrMapOvr>
+    <a:masterClrMapping/>
+  </p:clrMapOvr>
+</p:sld>
+</file>
+
+<file path=ppt/slides/slide16.xml><?xml version="1.0" encoding="utf-8"?>
+<p:sld xmlns:a="http://schemas.openxmlformats.org/drawingml/2006/main" xmlns:r="http://schemas.openxmlformats.org/officeDocument/2006/relationships" xmlns:p="http://schemas.openxmlformats.org/presentationml/2006/main">
+  <p:cSld>
+    <p:spTree>
+      <p:nvGrpSpPr>
+        <p:cNvPr id="1" name=""/>
+        <p:cNvGrpSpPr/>
+        <p:nvPr/>
+      </p:nvGrpSpPr>
+      <p:grpSpPr>
+        <a:xfrm>
+          <a:off x="0" y="0"/>
+          <a:ext cx="0" cy="0"/>
+          <a:chOff x="0" y="0"/>
+          <a:chExt cx="0" cy="0"/>
+        </a:xfrm>
+      </p:grpSpPr>
+      <p:sp>
+        <p:nvSpPr>
           <p:cNvPr id="2" name="Title 1"/>
           <p:cNvSpPr>
             <a:spLocks noGrp="1"/>
@@ -5362,7 +5975,7 @@
           <a:p>
             <a:fld id="{B54884B7-6C20-497E-907D-B5AAC07785D1}" type="slidenum">
               <a:rPr lang="en-US" smtClean="0"/>
-              <a:t>15</a:t>
+              <a:t>16</a:t>
             </a:fld>
             <a:endParaRPr lang="en-US"/>
           </a:p>
@@ -5371,7 +5984,7 @@
     </p:spTree>
     <p:extLst>
       <p:ext uri="{BB962C8B-B14F-4D97-AF65-F5344CB8AC3E}">
-        <p14:creationId xmlns:p14="http://schemas.microsoft.com/office/powerpoint/2010/main" val="3776784992"/>
+        <p14:creationId xmlns:p14="http://schemas.microsoft.com/office/powerpoint/2010/main" val="893469334"/>
       </p:ext>
     </p:extLst>
   </p:cSld>
@@ -5451,11 +6064,11 @@
               <a:buNone/>
             </a:pPr>
             <a:r>
-              <a:rPr lang="en-US" dirty="0" smtClean="0"/>
+              <a:rPr lang="en-US" sz="2400" dirty="0" smtClean="0"/>
               <a:t>A </a:t>
             </a:r>
             <a:r>
-              <a:rPr lang="en-US" dirty="0" smtClean="0">
+              <a:rPr lang="en-US" sz="2400" dirty="0" smtClean="0">
                 <a:solidFill>
                   <a:srgbClr val="FF0000"/>
                 </a:solidFill>
@@ -5463,238 +6076,276 @@
               <a:t>revelation</a:t>
             </a:r>
             <a:r>
-              <a:rPr lang="en-US" dirty="0" smtClean="0"/>
-              <a:t> (</a:t>
-            </a:r>
-            <a:r>
-              <a:rPr lang="el-GR" b="1" dirty="0">
-                <a:latin typeface="Times New Roman" panose="02020603050405020304" pitchFamily="18" charset="0"/>
-                <a:cs typeface="Times New Roman" panose="02020603050405020304" pitchFamily="18" charset="0"/>
-              </a:rPr>
-              <a:t>Ἀποκάλυψις</a:t>
-            </a:r>
-            <a:r>
-              <a:rPr lang="en-US" dirty="0" smtClean="0"/>
-              <a:t>)of </a:t>
-            </a:r>
-            <a:r>
-              <a:rPr lang="en-US" dirty="0"/>
-              <a:t>Jesus Christ which God granted to him to show </a:t>
-            </a:r>
-            <a:r>
-              <a:rPr lang="en-US" dirty="0">
+              <a:rPr lang="en-US" sz="2400" dirty="0" smtClean="0"/>
+              <a:t> </a:t>
+            </a:r>
+            <a:r>
+              <a:rPr lang="en-US" sz="2400" dirty="0" smtClean="0"/>
+              <a:t>of </a:t>
+            </a:r>
+            <a:r>
+              <a:rPr lang="en-US" sz="2400" dirty="0" smtClean="0"/>
+              <a:t>Jesus </a:t>
+            </a:r>
+            <a:r>
+              <a:rPr lang="en-US" sz="2400" dirty="0"/>
+              <a:t>Christ which God granted to him to show to his servants the things which must </a:t>
+            </a:r>
+            <a:r>
+              <a:rPr lang="en-US" sz="2400" dirty="0" smtClean="0"/>
+              <a:t>happen </a:t>
+            </a:r>
+            <a:r>
+              <a:rPr lang="en-US" sz="2400" dirty="0" smtClean="0"/>
+              <a:t>soon</a:t>
+            </a:r>
+            <a:r>
+              <a:rPr lang="en-US" sz="2400" dirty="0" smtClean="0"/>
+              <a:t>, and he made it known </a:t>
+            </a:r>
+            <a:r>
+              <a:rPr lang="en-US" sz="2400" dirty="0" smtClean="0"/>
+              <a:t>by </a:t>
+            </a:r>
+            <a:r>
+              <a:rPr lang="en-US" sz="2400" dirty="0" smtClean="0"/>
+              <a:t>sending his angle to his servant John…  Blessed </a:t>
+            </a:r>
+            <a:r>
+              <a:rPr lang="en-US" sz="2400" dirty="0"/>
+              <a:t>is the </a:t>
+            </a:r>
+            <a:r>
+              <a:rPr lang="en-US" sz="2400" dirty="0">
                 <a:solidFill>
                   <a:srgbClr val="FF0000"/>
                 </a:solidFill>
               </a:rPr>
-              <a:t>to his servants the things which must </a:t>
+              <a:t>one who reads and those who hear the words of prophecy</a:t>
+            </a:r>
+            <a:r>
+              <a:rPr lang="en-US" sz="2400" dirty="0"/>
+              <a:t> and keep the things which are written in </a:t>
+            </a:r>
+            <a:r>
+              <a:rPr lang="en-US" sz="2400" dirty="0" smtClean="0"/>
+              <a:t>it, </a:t>
+            </a:r>
+            <a:r>
+              <a:rPr lang="en-US" sz="2400" smtClean="0"/>
+              <a:t>for the time is near.”</a:t>
+            </a:r>
+            <a:endParaRPr lang="en-US" sz="2400" dirty="0" smtClean="0"/>
+          </a:p>
+          <a:p>
+            <a:pPr marL="114300" indent="0">
+              <a:buNone/>
+            </a:pPr>
+            <a:endParaRPr lang="en-US" sz="2400" dirty="0" smtClean="0"/>
+          </a:p>
+          <a:p>
+            <a:pPr marL="114300" indent="0">
+              <a:buNone/>
+            </a:pPr>
+            <a:r>
+              <a:rPr lang="el-GR" dirty="0">
+                <a:solidFill>
+                  <a:srgbClr val="FF0000"/>
+                </a:solidFill>
+                <a:latin typeface="Times New Roman" panose="02020603050405020304" pitchFamily="18" charset="0"/>
+                <a:cs typeface="Times New Roman" panose="02020603050405020304" pitchFamily="18" charset="0"/>
+              </a:rPr>
+              <a:t>Ἀποκάλυψις</a:t>
+            </a:r>
+            <a:r>
+              <a:rPr lang="el-GR" dirty="0">
+                <a:latin typeface="Times New Roman" panose="02020603050405020304" pitchFamily="18" charset="0"/>
+                <a:cs typeface="Times New Roman" panose="02020603050405020304" pitchFamily="18" charset="0"/>
+              </a:rPr>
+              <a:t> Ἰησοῦ Χριστοῦ, ἣν ἔδωκεν αὐτῷ ὁ	</a:t>
+            </a:r>
+            <a:r>
+              <a:rPr lang="en-US" dirty="0" smtClean="0">
+                <a:latin typeface="Times New Roman" panose="02020603050405020304" pitchFamily="18" charset="0"/>
+                <a:cs typeface="Times New Roman" panose="02020603050405020304" pitchFamily="18" charset="0"/>
+              </a:rPr>
+              <a:t> </a:t>
+            </a:r>
+            <a:r>
+              <a:rPr lang="el-GR" dirty="0" smtClean="0">
+                <a:latin typeface="Times New Roman" panose="02020603050405020304" pitchFamily="18" charset="0"/>
+                <a:cs typeface="Times New Roman" panose="02020603050405020304" pitchFamily="18" charset="0"/>
+              </a:rPr>
+              <a:t>Θεός</a:t>
+            </a:r>
+            <a:r>
+              <a:rPr lang="el-GR" dirty="0">
+                <a:latin typeface="Times New Roman" panose="02020603050405020304" pitchFamily="18" charset="0"/>
+                <a:cs typeface="Times New Roman" panose="02020603050405020304" pitchFamily="18" charset="0"/>
+              </a:rPr>
+              <a:t>, δεῖξαι τοῖς δούλοις αὐτοῦ ἃ δεῖ γενέσθαι ἐν τάχει, </a:t>
+            </a:r>
+            <a:r>
+              <a:rPr lang="el-GR" dirty="0" smtClean="0">
+                <a:latin typeface="Times New Roman" panose="02020603050405020304" pitchFamily="18" charset="0"/>
+                <a:cs typeface="Times New Roman" panose="02020603050405020304" pitchFamily="18" charset="0"/>
+              </a:rPr>
+              <a:t>καὶ</a:t>
+            </a:r>
+            <a:r>
+              <a:rPr lang="en-US" dirty="0" smtClean="0">
+                <a:latin typeface="Times New Roman" panose="02020603050405020304" pitchFamily="18" charset="0"/>
+                <a:cs typeface="Times New Roman" panose="02020603050405020304" pitchFamily="18" charset="0"/>
+              </a:rPr>
+              <a:t> </a:t>
+            </a:r>
+            <a:r>
+              <a:rPr lang="el-GR" dirty="0" smtClean="0">
+                <a:latin typeface="Times New Roman" panose="02020603050405020304" pitchFamily="18" charset="0"/>
+                <a:cs typeface="Times New Roman" panose="02020603050405020304" pitchFamily="18" charset="0"/>
+              </a:rPr>
+              <a:t>ἐσήμανεν </a:t>
+            </a:r>
+            <a:r>
+              <a:rPr lang="el-GR" dirty="0">
+                <a:latin typeface="Times New Roman" panose="02020603050405020304" pitchFamily="18" charset="0"/>
+                <a:cs typeface="Times New Roman" panose="02020603050405020304" pitchFamily="18" charset="0"/>
+              </a:rPr>
+              <a:t>ἀποστείλας διὰ τοῦ ἀγγέλου αὐτοῦ, τῷ </a:t>
+            </a:r>
+            <a:r>
+              <a:rPr lang="el-GR" dirty="0" smtClean="0">
+                <a:latin typeface="Times New Roman" panose="02020603050405020304" pitchFamily="18" charset="0"/>
+                <a:cs typeface="Times New Roman" panose="02020603050405020304" pitchFamily="18" charset="0"/>
+              </a:rPr>
+              <a:t>δούλῳ</a:t>
+            </a:r>
+            <a:r>
+              <a:rPr lang="en-US" dirty="0" smtClean="0">
+                <a:latin typeface="Times New Roman" panose="02020603050405020304" pitchFamily="18" charset="0"/>
+                <a:cs typeface="Times New Roman" panose="02020603050405020304" pitchFamily="18" charset="0"/>
+              </a:rPr>
+              <a:t> </a:t>
+            </a:r>
+            <a:r>
+              <a:rPr lang="el-GR" dirty="0" smtClean="0">
+                <a:latin typeface="Times New Roman" panose="02020603050405020304" pitchFamily="18" charset="0"/>
+                <a:cs typeface="Times New Roman" panose="02020603050405020304" pitchFamily="18" charset="0"/>
+              </a:rPr>
+              <a:t>αὐτοῦ Ἰωάνῃ</a:t>
+            </a:r>
+            <a:r>
+              <a:rPr lang="en-US" dirty="0" smtClean="0">
+                <a:latin typeface="Times New Roman" panose="02020603050405020304" pitchFamily="18" charset="0"/>
+                <a:cs typeface="Times New Roman" panose="02020603050405020304" pitchFamily="18" charset="0"/>
+              </a:rPr>
+              <a:t>…</a:t>
+            </a:r>
+            <a:r>
+              <a:rPr lang="el-GR" dirty="0" smtClean="0">
+                <a:latin typeface="Times New Roman" panose="02020603050405020304" pitchFamily="18" charset="0"/>
+                <a:cs typeface="Times New Roman" panose="02020603050405020304" pitchFamily="18" charset="0"/>
+              </a:rPr>
+              <a:t> </a:t>
+            </a:r>
+            <a:r>
+              <a:rPr lang="el-GR" dirty="0">
+                <a:latin typeface="Times New Roman" panose="02020603050405020304" pitchFamily="18" charset="0"/>
+                <a:cs typeface="Times New Roman" panose="02020603050405020304" pitchFamily="18" charset="0"/>
+              </a:rPr>
+              <a:t>Μακάριος </a:t>
+            </a:r>
+            <a:r>
+              <a:rPr lang="el-GR" dirty="0" smtClean="0">
+                <a:solidFill>
+                  <a:srgbClr val="FF0000"/>
+                </a:solidFill>
+                <a:latin typeface="Times New Roman" panose="02020603050405020304" pitchFamily="18" charset="0"/>
+                <a:cs typeface="Times New Roman" panose="02020603050405020304" pitchFamily="18" charset="0"/>
+              </a:rPr>
+              <a:t>ὁ</a:t>
             </a:r>
             <a:r>
               <a:rPr lang="en-US" dirty="0" smtClean="0">
                 <a:solidFill>
                   <a:srgbClr val="FF0000"/>
                 </a:solidFill>
-              </a:rPr>
-              <a:t>happen </a:t>
-            </a:r>
-            <a:r>
-              <a:rPr lang="en-US" dirty="0"/>
-              <a:t>(</a:t>
-            </a:r>
-            <a:r>
-              <a:rPr lang="el-GR" b="1" dirty="0">
                 <a:latin typeface="Times New Roman" panose="02020603050405020304" pitchFamily="18" charset="0"/>
                 <a:cs typeface="Times New Roman" panose="02020603050405020304" pitchFamily="18" charset="0"/>
               </a:rPr>
-              <a:t>ἃ δεῖ γενέσθαι</a:t>
-            </a:r>
-            <a:r>
-              <a:rPr lang="en-US" dirty="0"/>
-              <a:t>) </a:t>
-            </a:r>
-            <a:r>
-              <a:rPr lang="en-US" dirty="0" smtClean="0"/>
-              <a:t>soon, and he made it known by sending his angle to his servant John… </a:t>
+              <a:t> </a:t>
+            </a:r>
+            <a:r>
+              <a:rPr lang="el-GR" dirty="0" smtClean="0">
+                <a:solidFill>
+                  <a:srgbClr val="FF0000"/>
+                </a:solidFill>
+                <a:latin typeface="Times New Roman" panose="02020603050405020304" pitchFamily="18" charset="0"/>
+                <a:cs typeface="Times New Roman" panose="02020603050405020304" pitchFamily="18" charset="0"/>
+              </a:rPr>
+              <a:t>ἀναγινώσκων </a:t>
+            </a:r>
+            <a:r>
+              <a:rPr lang="el-GR" dirty="0">
+                <a:solidFill>
+                  <a:srgbClr val="FF0000"/>
+                </a:solidFill>
+                <a:latin typeface="Times New Roman" panose="02020603050405020304" pitchFamily="18" charset="0"/>
+                <a:cs typeface="Times New Roman" panose="02020603050405020304" pitchFamily="18" charset="0"/>
+              </a:rPr>
+              <a:t>καὶ οἱ ἀκούοντες τοὺς λόγους τῆς </a:t>
+            </a:r>
+            <a:r>
+              <a:rPr lang="el-GR" dirty="0" smtClean="0">
+                <a:solidFill>
+                  <a:srgbClr val="FF0000"/>
+                </a:solidFill>
+                <a:latin typeface="Times New Roman" panose="02020603050405020304" pitchFamily="18" charset="0"/>
+                <a:cs typeface="Times New Roman" panose="02020603050405020304" pitchFamily="18" charset="0"/>
+              </a:rPr>
+              <a:t>προφητείας</a:t>
             </a:r>
             <a:r>
               <a:rPr lang="en-US" dirty="0" smtClean="0">
                 <a:solidFill>
                   <a:srgbClr val="FF0000"/>
                 </a:solidFill>
-              </a:rPr>
-              <a:t> </a:t>
-            </a:r>
-            <a:r>
-              <a:rPr lang="en-US" dirty="0" smtClean="0"/>
-              <a:t>Blessed </a:t>
-            </a:r>
-            <a:r>
-              <a:rPr lang="en-US" dirty="0"/>
-              <a:t>is the one who reads and those who hear the words of prophecy and keep the things which are written in it</a:t>
-            </a:r>
-            <a:r>
-              <a:rPr lang="en-US" dirty="0" smtClean="0"/>
-              <a:t>”</a:t>
-            </a:r>
-          </a:p>
-          <a:p>
-            <a:r>
-              <a:rPr lang="en-US" dirty="0" smtClean="0"/>
-              <a:t>Surely </a:t>
-            </a:r>
-            <a:r>
-              <a:rPr lang="en-US" dirty="0"/>
-              <a:t>the Lord GOD does nothing, without </a:t>
-            </a:r>
-            <a:r>
-              <a:rPr lang="en-US" dirty="0">
-                <a:solidFill>
-                  <a:srgbClr val="FF0000"/>
-                </a:solidFill>
-              </a:rPr>
-              <a:t>revealing</a:t>
-            </a:r>
-            <a:r>
-              <a:rPr lang="en-US" dirty="0"/>
-              <a:t> </a:t>
-            </a:r>
-            <a:r>
-              <a:rPr lang="en-US" dirty="0" smtClean="0"/>
-              <a:t>(</a:t>
-            </a:r>
-            <a:r>
-              <a:rPr lang="el-GR" b="1" dirty="0" smtClean="0">
                 <a:latin typeface="Times New Roman" panose="02020603050405020304" pitchFamily="18" charset="0"/>
                 <a:cs typeface="Times New Roman" panose="02020603050405020304" pitchFamily="18" charset="0"/>
               </a:rPr>
-              <a:t>ἀποκαλύψῃ</a:t>
-            </a:r>
-            <a:r>
-              <a:rPr lang="en-US" dirty="0" smtClean="0">
+              <a:t> </a:t>
+            </a:r>
+            <a:r>
+              <a:rPr lang="el-GR" dirty="0" smtClean="0">
                 <a:latin typeface="Times New Roman" panose="02020603050405020304" pitchFamily="18" charset="0"/>
                 <a:cs typeface="Times New Roman" panose="02020603050405020304" pitchFamily="18" charset="0"/>
               </a:rPr>
-              <a:t>) </a:t>
-            </a:r>
-            <a:r>
-              <a:rPr lang="en-US" dirty="0" smtClean="0"/>
-              <a:t>his </a:t>
-            </a:r>
-            <a:r>
-              <a:rPr lang="en-US" dirty="0"/>
-              <a:t>secret </a:t>
-            </a:r>
-            <a:r>
-              <a:rPr lang="en-US" dirty="0">
-                <a:solidFill>
-                  <a:srgbClr val="FF0000"/>
-                </a:solidFill>
-              </a:rPr>
-              <a:t>to his servants </a:t>
-            </a:r>
-            <a:r>
-              <a:rPr lang="en-US" dirty="0"/>
-              <a:t>the prophets. (</a:t>
-            </a:r>
-            <a:r>
-              <a:rPr lang="en-US" dirty="0" smtClean="0"/>
-              <a:t>Amos </a:t>
-            </a:r>
-            <a:r>
-              <a:rPr lang="en-US" dirty="0"/>
-              <a:t>3:7 </a:t>
-            </a:r>
-            <a:r>
-              <a:rPr lang="en-US" dirty="0" smtClean="0"/>
-              <a:t>NRSV)</a:t>
-            </a:r>
-          </a:p>
-          <a:p>
-            <a:r>
-              <a:rPr lang="en-US" dirty="0"/>
-              <a:t>but there is a God in heaven who reveals mysteries, and he has disclosed to King Nebuchadnezzar </a:t>
-            </a:r>
-            <a:r>
-              <a:rPr lang="en-US" dirty="0">
-                <a:solidFill>
-                  <a:srgbClr val="FF0000"/>
-                </a:solidFill>
-              </a:rPr>
-              <a:t>what will happen </a:t>
-            </a:r>
-            <a:r>
-              <a:rPr lang="en-US" dirty="0" smtClean="0"/>
-              <a:t>(</a:t>
-            </a:r>
-            <a:r>
-              <a:rPr lang="el-GR" b="1" dirty="0">
+              <a:t>καὶ </a:t>
+            </a:r>
+            <a:r>
+              <a:rPr lang="el-GR" dirty="0">
                 <a:latin typeface="Times New Roman" panose="02020603050405020304" pitchFamily="18" charset="0"/>
                 <a:cs typeface="Times New Roman" panose="02020603050405020304" pitchFamily="18" charset="0"/>
               </a:rPr>
-              <a:t>ἃ δεῖ </a:t>
-            </a:r>
-            <a:r>
-              <a:rPr lang="el-GR" b="1" dirty="0" smtClean="0">
+              <a:t>τηροῦντες τὰ ἐν αὐτῇ </a:t>
+            </a:r>
+            <a:r>
+              <a:rPr lang="el-GR" dirty="0" smtClean="0">
                 <a:latin typeface="Times New Roman" panose="02020603050405020304" pitchFamily="18" charset="0"/>
                 <a:cs typeface="Times New Roman" panose="02020603050405020304" pitchFamily="18" charset="0"/>
               </a:rPr>
-              <a:t>γενέσθαι</a:t>
-            </a:r>
-            <a:r>
-              <a:rPr lang="en-US" dirty="0" smtClean="0"/>
-              <a:t>) at </a:t>
-            </a:r>
-            <a:r>
-              <a:rPr lang="en-US" dirty="0"/>
-              <a:t>the end of </a:t>
-            </a:r>
-            <a:r>
-              <a:rPr lang="en-US" dirty="0" smtClean="0"/>
-              <a:t>days…. </a:t>
-            </a:r>
-            <a:r>
-              <a:rPr lang="en-US" dirty="0"/>
-              <a:t>The great God has </a:t>
-            </a:r>
-            <a:r>
-              <a:rPr lang="en-US" dirty="0" smtClean="0">
-                <a:solidFill>
-                  <a:srgbClr val="FF0000"/>
-                </a:solidFill>
-              </a:rPr>
-              <a:t>informed</a:t>
-            </a:r>
-            <a:r>
-              <a:rPr lang="en-US" dirty="0" smtClean="0"/>
-              <a:t> (</a:t>
-            </a:r>
-            <a:r>
-              <a:rPr lang="el-GR" b="1" dirty="0" smtClean="0">
-                <a:latin typeface="Times New Roman" panose="02020603050405020304" pitchFamily="18" charset="0"/>
-                <a:cs typeface="Times New Roman" panose="02020603050405020304" pitchFamily="18" charset="0"/>
-              </a:rPr>
-              <a:t>ἐσήμανεν</a:t>
-            </a:r>
-            <a:r>
-              <a:rPr lang="en-US" b="1" dirty="0" smtClean="0"/>
-              <a:t>)</a:t>
-            </a:r>
-            <a:r>
-              <a:rPr lang="en-US" dirty="0" smtClean="0"/>
-              <a:t> </a:t>
-            </a:r>
-            <a:r>
-              <a:rPr lang="en-US" dirty="0"/>
-              <a:t>the king what shall be hereafter. The dream is certain, and its interpretation trustworthy." (Dan </a:t>
-            </a:r>
-            <a:r>
-              <a:rPr lang="en-US" dirty="0" smtClean="0"/>
-              <a:t>2:28, 45 NRSV)</a:t>
-            </a:r>
-            <a:endParaRPr lang="el-GR" dirty="0">
+              <a:t>γεγραμμένα· ὁ γὰρ καιρὸς ἐγγύς.</a:t>
+            </a:r>
+            <a:endParaRPr lang="en-US" dirty="0" smtClean="0">
               <a:latin typeface="Times New Roman" panose="02020603050405020304" pitchFamily="18" charset="0"/>
               <a:cs typeface="Times New Roman" panose="02020603050405020304" pitchFamily="18" charset="0"/>
             </a:endParaRPr>
+          </a:p>
+          <a:p>
+            <a:pPr marL="114300" indent="0">
+              <a:buNone/>
+            </a:pPr>
+            <a:endParaRPr lang="en-US" sz="2400" dirty="0" smtClean="0"/>
           </a:p>
         </p:txBody>
       </p:sp>
@@ -5791,7 +6442,11 @@
           <a:p>
             <a:r>
               <a:rPr lang="en-US" dirty="0" smtClean="0"/>
-              <a:t>Taxonomy of Intertextuality</a:t>
+              <a:t>A Taxonomy </a:t>
+            </a:r>
+            <a:r>
+              <a:rPr lang="en-US" dirty="0" smtClean="0"/>
+              <a:t>of Intertextuality</a:t>
             </a:r>
             <a:endParaRPr lang="en-US" dirty="0"/>
           </a:p>
@@ -5929,7 +6584,6 @@
               <a:rPr lang="en-US" sz="2800" dirty="0"/>
               <a:t>Quotation: The use of a pre-existing phrase, sentence, or paragraph which is taken from another source</a:t>
             </a:r>
-            <a:endParaRPr lang="en-US" sz="2800" dirty="0"/>
           </a:p>
         </p:txBody>
       </p:sp>
@@ -6337,7 +6991,6 @@
               <a:rPr lang="en-US" sz="2800" dirty="0"/>
               <a:t>reference to another text through the use of extended verbal parallel or “catchwords”</a:t>
             </a:r>
-            <a:endParaRPr lang="en-US" sz="2800" dirty="0"/>
           </a:p>
         </p:txBody>
       </p:sp>
@@ -7079,27 +7732,14 @@
           <a:p>
             <a:r>
               <a:rPr lang="en-US" dirty="0" smtClean="0"/>
-              <a:t>Desolated </a:t>
-            </a:r>
+              <a:t>Desolated cities being repopulated with wild beasts </a:t>
+            </a:r>
+          </a:p>
+          <a:p>
+            <a:pPr lvl="1"/>
             <a:r>
               <a:rPr lang="en-US" dirty="0" smtClean="0"/>
-              <a:t>cities being repopulated with wild beasts </a:t>
-            </a:r>
-            <a:endParaRPr lang="en-US" dirty="0" smtClean="0"/>
-          </a:p>
-          <a:p>
-            <a:pPr lvl="1"/>
-            <a:r>
-              <a:rPr lang="en-US" dirty="0" smtClean="0"/>
-              <a:t>Isa </a:t>
-            </a:r>
-            <a:r>
-              <a:rPr lang="en-US" dirty="0" smtClean="0"/>
-              <a:t>13:21; </a:t>
-            </a:r>
-            <a:r>
-              <a:rPr lang="en-US" dirty="0" smtClean="0"/>
-              <a:t>34:11-14</a:t>
+              <a:t>Isa 13:21; 34:11-14</a:t>
             </a:r>
           </a:p>
           <a:p>
@@ -7115,20 +7755,11 @@
               <a:rPr lang="en-US" dirty="0" smtClean="0"/>
               <a:t>Nah 3:4</a:t>
             </a:r>
-            <a:endParaRPr lang="en-US" dirty="0" smtClean="0"/>
           </a:p>
           <a:p>
             <a:r>
               <a:rPr lang="en-US" dirty="0" smtClean="0"/>
-              <a:t>Locusts </a:t>
-            </a:r>
-            <a:r>
-              <a:rPr lang="en-US" dirty="0" smtClean="0"/>
-              <a:t>as a foreign </a:t>
-            </a:r>
-            <a:r>
-              <a:rPr lang="en-US" dirty="0" smtClean="0"/>
-              <a:t>army</a:t>
+              <a:t>Locusts as a foreign army</a:t>
             </a:r>
           </a:p>
           <a:p>

</xml_diff>